<commit_message>
adição do último slide com uma imagem do processo geral
</commit_message>
<xml_diff>
--- a/scrum.pptx
+++ b/scrum.pptx
@@ -5,7 +5,7 @@
     <p:sldMasterId id="2147483648" r:id="rId1"/>
   </p:sldMasterIdLst>
   <p:notesMasterIdLst>
-    <p:notesMasterId r:id="rId36"/>
+    <p:notesMasterId r:id="rId37"/>
   </p:notesMasterIdLst>
   <p:sldIdLst>
     <p:sldId id="256" r:id="rId2"/>
@@ -41,7 +41,8 @@
     <p:sldId id="329" r:id="rId32"/>
     <p:sldId id="330" r:id="rId33"/>
     <p:sldId id="331" r:id="rId34"/>
-    <p:sldId id="298" r:id="rId35"/>
+    <p:sldId id="332" r:id="rId35"/>
+    <p:sldId id="298" r:id="rId36"/>
   </p:sldIdLst>
   <p:sldSz cx="12192000" cy="6858000"/>
   <p:notesSz cx="6858000" cy="9144000"/>
@@ -230,7 +231,7 @@
           <a:p>
             <a:fld id="{94D3EB41-CF60-4C9F-BD83-AE56FA0945EB}" type="datetimeFigureOut">
               <a:rPr lang="pt-BR" smtClean="0"/>
-              <a:t>29/04/2019</a:t>
+              <a:t>30/04/2019</a:t>
             </a:fld>
             <a:endParaRPr lang="pt-BR"/>
           </a:p>
@@ -916,7 +917,7 @@
           <a:p>
             <a:fld id="{9642BF85-54FF-46CE-B398-87F998CFD60B}" type="datetimeFigureOut">
               <a:rPr lang="pt-BR" smtClean="0"/>
-              <a:t>29/04/2019</a:t>
+              <a:t>30/04/2019</a:t>
             </a:fld>
             <a:endParaRPr lang="pt-BR"/>
           </a:p>
@@ -1084,7 +1085,7 @@
           <a:p>
             <a:fld id="{9642BF85-54FF-46CE-B398-87F998CFD60B}" type="datetimeFigureOut">
               <a:rPr lang="pt-BR" smtClean="0"/>
-              <a:t>29/04/2019</a:t>
+              <a:t>30/04/2019</a:t>
             </a:fld>
             <a:endParaRPr lang="pt-BR"/>
           </a:p>
@@ -1262,7 +1263,7 @@
           <a:p>
             <a:fld id="{9642BF85-54FF-46CE-B398-87F998CFD60B}" type="datetimeFigureOut">
               <a:rPr lang="pt-BR" smtClean="0"/>
-              <a:t>29/04/2019</a:t>
+              <a:t>30/04/2019</a:t>
             </a:fld>
             <a:endParaRPr lang="pt-BR"/>
           </a:p>
@@ -1599,7 +1600,7 @@
           <a:p>
             <a:fld id="{9642BF85-54FF-46CE-B398-87F998CFD60B}" type="datetimeFigureOut">
               <a:rPr lang="pt-BR" smtClean="0"/>
-              <a:t>29/04/2019</a:t>
+              <a:t>30/04/2019</a:t>
             </a:fld>
             <a:endParaRPr lang="pt-BR"/>
           </a:p>
@@ -1870,7 +1871,7 @@
           <a:p>
             <a:fld id="{9642BF85-54FF-46CE-B398-87F998CFD60B}" type="datetimeFigureOut">
               <a:rPr lang="pt-BR" smtClean="0"/>
-              <a:t>29/04/2019</a:t>
+              <a:t>30/04/2019</a:t>
             </a:fld>
             <a:endParaRPr lang="pt-BR"/>
           </a:p>
@@ -2116,7 +2117,7 @@
           <a:p>
             <a:fld id="{9642BF85-54FF-46CE-B398-87F998CFD60B}" type="datetimeFigureOut">
               <a:rPr lang="pt-BR" smtClean="0"/>
-              <a:t>29/04/2019</a:t>
+              <a:t>30/04/2019</a:t>
             </a:fld>
             <a:endParaRPr lang="pt-BR"/>
           </a:p>
@@ -2480,7 +2481,7 @@
           <a:p>
             <a:fld id="{9642BF85-54FF-46CE-B398-87F998CFD60B}" type="datetimeFigureOut">
               <a:rPr lang="pt-BR" smtClean="0"/>
-              <a:t>29/04/2019</a:t>
+              <a:t>30/04/2019</a:t>
             </a:fld>
             <a:endParaRPr lang="pt-BR"/>
           </a:p>
@@ -2614,7 +2615,7 @@
           <a:p>
             <a:fld id="{9642BF85-54FF-46CE-B398-87F998CFD60B}" type="datetimeFigureOut">
               <a:rPr lang="pt-BR" smtClean="0"/>
-              <a:t>29/04/2019</a:t>
+              <a:t>30/04/2019</a:t>
             </a:fld>
             <a:endParaRPr lang="pt-BR"/>
           </a:p>
@@ -2709,7 +2710,7 @@
           <a:p>
             <a:fld id="{9642BF85-54FF-46CE-B398-87F998CFD60B}" type="datetimeFigureOut">
               <a:rPr lang="pt-BR" smtClean="0"/>
-              <a:t>29/04/2019</a:t>
+              <a:t>30/04/2019</a:t>
             </a:fld>
             <a:endParaRPr lang="pt-BR"/>
           </a:p>
@@ -2984,7 +2985,7 @@
           <a:p>
             <a:fld id="{9642BF85-54FF-46CE-B398-87F998CFD60B}" type="datetimeFigureOut">
               <a:rPr lang="pt-BR" smtClean="0"/>
-              <a:t>29/04/2019</a:t>
+              <a:t>30/04/2019</a:t>
             </a:fld>
             <a:endParaRPr lang="pt-BR"/>
           </a:p>
@@ -3236,7 +3237,7 @@
           <a:p>
             <a:fld id="{9642BF85-54FF-46CE-B398-87F998CFD60B}" type="datetimeFigureOut">
               <a:rPr lang="pt-BR" smtClean="0"/>
-              <a:t>29/04/2019</a:t>
+              <a:t>30/04/2019</a:t>
             </a:fld>
             <a:endParaRPr lang="pt-BR"/>
           </a:p>
@@ -3456,7 +3457,7 @@
           <a:p>
             <a:fld id="{9642BF85-54FF-46CE-B398-87F998CFD60B}" type="datetimeFigureOut">
               <a:rPr lang="pt-BR" smtClean="0"/>
-              <a:t>29/04/2019</a:t>
+              <a:t>30/04/2019</a:t>
             </a:fld>
             <a:endParaRPr lang="pt-BR"/>
           </a:p>
@@ -6986,11 +6987,7 @@
           <a:p>
             <a:r>
               <a:rPr lang="pt-BR" dirty="0" smtClean="0"/>
-              <a:t>Sprint</a:t>
-            </a:r>
-            <a:r>
-              <a:rPr lang="pt-BR" dirty="0" smtClean="0"/>
-              <a:t> </a:t>
+              <a:t>Sprint </a:t>
             </a:r>
             <a:r>
               <a:rPr lang="pt-BR" dirty="0" err="1" smtClean="0"/>
@@ -7204,11 +7201,7 @@
           <a:p>
             <a:r>
               <a:rPr lang="pt-BR" dirty="0" smtClean="0"/>
-              <a:t>Sprint</a:t>
-            </a:r>
-            <a:r>
-              <a:rPr lang="pt-BR" dirty="0" smtClean="0"/>
-              <a:t> </a:t>
+              <a:t>Sprint </a:t>
             </a:r>
             <a:r>
               <a:rPr lang="pt-BR" dirty="0" err="1" smtClean="0"/>
@@ -7588,6 +7581,111 @@
 </file>
 
 <file path=ppt/slides/slide34.xml><?xml version="1.0" encoding="utf-8"?>
+<p:sld xmlns:a="http://schemas.openxmlformats.org/drawingml/2006/main" xmlns:r="http://schemas.openxmlformats.org/officeDocument/2006/relationships" xmlns:p="http://schemas.openxmlformats.org/presentationml/2006/main">
+  <p:cSld>
+    <p:spTree>
+      <p:nvGrpSpPr>
+        <p:cNvPr id="1" name=""/>
+        <p:cNvGrpSpPr/>
+        <p:nvPr/>
+      </p:nvGrpSpPr>
+      <p:grpSpPr>
+        <a:xfrm>
+          <a:off x="0" y="0"/>
+          <a:ext cx="0" cy="0"/>
+          <a:chOff x="0" y="0"/>
+          <a:chExt cx="0" cy="0"/>
+        </a:xfrm>
+      </p:grpSpPr>
+      <p:sp>
+        <p:nvSpPr>
+          <p:cNvPr id="5" name="Título 4"/>
+          <p:cNvSpPr>
+            <a:spLocks noGrp="1"/>
+          </p:cNvSpPr>
+          <p:nvPr>
+            <p:ph type="title"/>
+          </p:nvPr>
+        </p:nvSpPr>
+        <p:spPr/>
+        <p:txBody>
+          <a:bodyPr>
+            <a:normAutofit/>
+          </a:bodyPr>
+          <a:lstStyle/>
+          <a:p>
+            <a:r>
+              <a:rPr lang="pt-BR" dirty="0" smtClean="0"/>
+              <a:t>Processo Geral</a:t>
+            </a:r>
+            <a:endParaRPr lang="pt-BR" dirty="0"/>
+          </a:p>
+        </p:txBody>
+      </p:sp>
+      <p:pic>
+        <p:nvPicPr>
+          <p:cNvPr id="1026" name="Picture 2" descr="Product Vision in Scrum"/>
+          <p:cNvPicPr>
+            <a:picLocks noGrp="1" noChangeAspect="1" noChangeArrowheads="1"/>
+          </p:cNvPicPr>
+          <p:nvPr>
+            <p:ph idx="1"/>
+          </p:nvPr>
+        </p:nvPicPr>
+        <p:blipFill>
+          <a:blip r:embed="rId2">
+            <a:extLst>
+              <a:ext uri="{28A0092B-C50C-407E-A947-70E740481C1C}">
+                <a14:useLocalDpi xmlns:a14="http://schemas.microsoft.com/office/drawing/2010/main" val="0"/>
+              </a:ext>
+            </a:extLst>
+          </a:blip>
+          <a:srcRect/>
+          <a:stretch>
+            <a:fillRect/>
+          </a:stretch>
+        </p:blipFill>
+        <p:spPr bwMode="auto">
+          <a:xfrm>
+            <a:off x="1638600" y="1045159"/>
+            <a:ext cx="8914801" cy="5015325"/>
+          </a:xfrm>
+          <a:prstGeom prst="rect">
+            <a:avLst/>
+          </a:prstGeom>
+          <a:noFill/>
+          <a:extLst>
+            <a:ext uri="{909E8E84-426E-40DD-AFC4-6F175D3DCCD1}">
+              <a14:hiddenFill xmlns:a14="http://schemas.microsoft.com/office/drawing/2010/main">
+                <a:solidFill>
+                  <a:srgbClr val="FFFFFF"/>
+                </a:solidFill>
+              </a14:hiddenFill>
+            </a:ext>
+          </a:extLst>
+        </p:spPr>
+      </p:pic>
+    </p:spTree>
+    <p:extLst>
+      <p:ext uri="{BB962C8B-B14F-4D97-AF65-F5344CB8AC3E}">
+        <p14:creationId xmlns:p14="http://schemas.microsoft.com/office/powerpoint/2010/main" val="2511727128"/>
+      </p:ext>
+    </p:extLst>
+  </p:cSld>
+  <p:clrMapOvr>
+    <a:masterClrMapping/>
+  </p:clrMapOvr>
+  <p:timing>
+    <p:tnLst>
+      <p:par>
+        <p:cTn id="1" dur="indefinite" restart="never" nodeType="tmRoot"/>
+      </p:par>
+    </p:tnLst>
+  </p:timing>
+</p:sld>
+</file>
+
+<file path=ppt/slides/slide35.xml><?xml version="1.0" encoding="utf-8"?>
 <p:sld xmlns:a="http://schemas.openxmlformats.org/drawingml/2006/main" xmlns:r="http://schemas.openxmlformats.org/officeDocument/2006/relationships" xmlns:p="http://schemas.openxmlformats.org/presentationml/2006/main">
   <p:cSld>
     <p:spTree>

</xml_diff>